<commit_message>
Provision: Added puppet classes golang::devel, gocd::agent, ruby::v2 (incomplete).
Also changed the machine names and role names.
</commit_message>
<xml_diff>
--- a/01-provision/xconf-sydney-2014-provision.pptx
+++ b/01-provision/xconf-sydney-2014-provision.pptx
@@ -14,6 +14,7 @@
     <p:sldId id="259" r:id="rId8"/>
     <p:sldId id="260" r:id="rId9"/>
     <p:sldId id="261" r:id="rId10"/>
+    <p:sldId id="265" r:id="rId11"/>
   </p:sldIdLst>
   <p:sldSz cx="9144000" cy="6858000" type="screen4x3"/>
   <p:notesSz cx="6858000" cy="9144000"/>
@@ -3172,6 +3173,203 @@
 </p:sld>
 </file>
 
+<file path=ppt/slides/slide10.xml><?xml version="1.0" encoding="utf-8"?>
+<p:sld xmlns:a="http://schemas.openxmlformats.org/drawingml/2006/main" xmlns:r="http://schemas.openxmlformats.org/officeDocument/2006/relationships" xmlns:p="http://schemas.openxmlformats.org/presentationml/2006/main">
+  <p:cSld>
+    <p:spTree>
+      <p:nvGrpSpPr>
+        <p:cNvPr id="1" name=""/>
+        <p:cNvGrpSpPr/>
+        <p:nvPr/>
+      </p:nvGrpSpPr>
+      <p:grpSpPr>
+        <a:xfrm>
+          <a:off x="0" y="0"/>
+          <a:ext cx="0" cy="0"/>
+          <a:chOff x="0" y="0"/>
+          <a:chExt cx="0" cy="0"/>
+        </a:xfrm>
+      </p:grpSpPr>
+      <p:sp>
+        <p:nvSpPr>
+          <p:cNvPr id="2" name="Title 1"/>
+          <p:cNvSpPr>
+            <a:spLocks noGrp="1"/>
+          </p:cNvSpPr>
+          <p:nvPr>
+            <p:ph type="title"/>
+          </p:nvPr>
+        </p:nvSpPr>
+        <p:spPr/>
+        <p:txBody>
+          <a:bodyPr/>
+          <a:lstStyle/>
+          <a:p>
+            <a:r>
+              <a:rPr lang="en-US" dirty="0" smtClean="0"/>
+              <a:t>Puppet - Basics</a:t>
+            </a:r>
+            <a:endParaRPr lang="en-US" dirty="0"/>
+          </a:p>
+        </p:txBody>
+      </p:sp>
+      <p:sp>
+        <p:nvSpPr>
+          <p:cNvPr id="3" name="Content Placeholder 2"/>
+          <p:cNvSpPr>
+            <a:spLocks noGrp="1"/>
+          </p:cNvSpPr>
+          <p:nvPr>
+            <p:ph idx="1"/>
+          </p:nvPr>
+        </p:nvSpPr>
+        <p:spPr/>
+        <p:txBody>
+          <a:bodyPr>
+            <a:normAutofit/>
+          </a:bodyPr>
+          <a:lstStyle/>
+          <a:p>
+            <a:pPr marL="0" indent="0">
+              <a:buNone/>
+            </a:pPr>
+            <a:r>
+              <a:rPr lang="en-US" dirty="0" smtClean="0"/>
+              <a:t>Run an arbitrary command</a:t>
+            </a:r>
+          </a:p>
+          <a:p>
+            <a:r>
+              <a:rPr lang="en-US" dirty="0" err="1" smtClean="0"/>
+              <a:t>Untar</a:t>
+            </a:r>
+            <a:r>
+              <a:rPr lang="en-US" dirty="0" smtClean="0"/>
+              <a:t> the </a:t>
+            </a:r>
+            <a:r>
+              <a:rPr lang="en-US" dirty="0" err="1" smtClean="0"/>
+              <a:t>golang</a:t>
+            </a:r>
+            <a:r>
+              <a:rPr lang="en-US" dirty="0" smtClean="0"/>
+              <a:t> </a:t>
+            </a:r>
+            <a:r>
+              <a:rPr lang="en-US" dirty="0" err="1" smtClean="0"/>
+              <a:t>tarball</a:t>
+            </a:r>
+            <a:r>
+              <a:rPr lang="en-US" dirty="0" smtClean="0"/>
+              <a:t> in /</a:t>
+            </a:r>
+            <a:r>
+              <a:rPr lang="en-US" dirty="0" err="1" smtClean="0"/>
+              <a:t>usr</a:t>
+            </a:r>
+            <a:r>
+              <a:rPr lang="en-US" dirty="0" smtClean="0"/>
+              <a:t>/local</a:t>
+            </a:r>
+          </a:p>
+          <a:p>
+            <a:endParaRPr lang="en-US" dirty="0" smtClean="0"/>
+          </a:p>
+          <a:p>
+            <a:pPr marL="0" indent="0">
+              <a:buNone/>
+            </a:pPr>
+            <a:r>
+              <a:rPr lang="en-US" dirty="0" smtClean="0"/>
+              <a:t>Place a file on to the file system</a:t>
+            </a:r>
+            <a:endParaRPr lang="en-US" dirty="0"/>
+          </a:p>
+          <a:p>
+            <a:r>
+              <a:rPr lang="en-US" dirty="0" smtClean="0"/>
+              <a:t>Put the following content into /</a:t>
+            </a:r>
+            <a:r>
+              <a:rPr lang="en-US" dirty="0" err="1" smtClean="0"/>
+              <a:t>etc</a:t>
+            </a:r>
+            <a:r>
+              <a:rPr lang="en-US" dirty="0" smtClean="0"/>
+              <a:t>/</a:t>
+            </a:r>
+            <a:r>
+              <a:rPr lang="en-US" dirty="0" err="1" smtClean="0"/>
+              <a:t>profile.d</a:t>
+            </a:r>
+            <a:r>
+              <a:rPr lang="en-US" dirty="0" smtClean="0"/>
+              <a:t>/</a:t>
+            </a:r>
+            <a:r>
+              <a:rPr lang="en-US" dirty="0" err="1" smtClean="0"/>
+              <a:t>golang.sh</a:t>
+            </a:r>
+            <a:endParaRPr lang="en-US" dirty="0" smtClean="0"/>
+          </a:p>
+          <a:p>
+            <a:pPr marL="400050" lvl="1" indent="0">
+              <a:buNone/>
+            </a:pPr>
+            <a:r>
+              <a:rPr lang="en-US" sz="2400" dirty="0" smtClean="0">
+                <a:latin typeface="Courier New"/>
+                <a:cs typeface="Courier New"/>
+              </a:rPr>
+              <a:t>export PATH=/</a:t>
+            </a:r>
+            <a:r>
+              <a:rPr lang="en-US" sz="2400" dirty="0" err="1" smtClean="0">
+                <a:latin typeface="Courier New"/>
+                <a:cs typeface="Courier New"/>
+              </a:rPr>
+              <a:t>usr</a:t>
+            </a:r>
+            <a:r>
+              <a:rPr lang="en-US" sz="2400" dirty="0" smtClean="0">
+                <a:latin typeface="Courier New"/>
+                <a:cs typeface="Courier New"/>
+              </a:rPr>
+              <a:t>/local/go/bin:${PATH}</a:t>
+            </a:r>
+            <a:endParaRPr lang="en-US" sz="2400" dirty="0">
+              <a:latin typeface="Courier New"/>
+              <a:cs typeface="Courier New"/>
+            </a:endParaRPr>
+          </a:p>
+          <a:p>
+            <a:pPr marL="0" indent="0">
+              <a:buNone/>
+            </a:pPr>
+            <a:endParaRPr lang="en-US" sz="2600" dirty="0"/>
+          </a:p>
+        </p:txBody>
+      </p:sp>
+    </p:spTree>
+    <p:extLst>
+      <p:ext uri="{BB962C8B-B14F-4D97-AF65-F5344CB8AC3E}">
+        <p14:creationId xmlns:p14="http://schemas.microsoft.com/office/powerpoint/2010/main" val="903861105"/>
+      </p:ext>
+    </p:extLst>
+  </p:cSld>
+  <p:clrMapOvr>
+    <a:masterClrMapping/>
+  </p:clrMapOvr>
+  <p:timing>
+    <p:tnLst>
+      <p:par>
+        <p:cTn xmlns:p14="http://schemas.microsoft.com/office/powerpoint/2010/main" id="1" dur="indefinite" restart="never" nodeType="tmRoot"/>
+      </p:par>
+    </p:tnLst>
+  </p:timing>
+</p:sld>
+</file>
+
 <file path=ppt/slides/slide2.xml><?xml version="1.0" encoding="utf-8"?>
 <p:sld xmlns:a="http://schemas.openxmlformats.org/drawingml/2006/main" xmlns:r="http://schemas.openxmlformats.org/officeDocument/2006/relationships" xmlns:p="http://schemas.openxmlformats.org/presentationml/2006/main">
   <p:cSld>
@@ -4036,7 +4234,7 @@
         <p:spPr/>
         <p:txBody>
           <a:bodyPr>
-            <a:normAutofit fontScale="92500" lnSpcReduction="10000"/>
+            <a:normAutofit fontScale="92500" lnSpcReduction="20000"/>
           </a:bodyPr>
           <a:lstStyle/>
           <a:p>
@@ -4070,7 +4268,15 @@
             </a:r>
             <a:r>
               <a:rPr lang="en-US" dirty="0" smtClean="0"/>
-              <a:t> is installed</a:t>
+              <a:t> and </a:t>
+            </a:r>
+            <a:r>
+              <a:rPr lang="en-US" dirty="0" err="1" smtClean="0"/>
+              <a:t>httpd</a:t>
+            </a:r>
+            <a:r>
+              <a:rPr lang="en-US" dirty="0" smtClean="0"/>
+              <a:t> are installed</a:t>
             </a:r>
           </a:p>
           <a:p>
@@ -4147,7 +4353,7 @@
               <a:buNone/>
             </a:pPr>
             <a:r>
-              <a:rPr lang="en-US" sz="2600" smtClean="0"/>
+              <a:rPr lang="en-US" sz="2600" dirty="0" smtClean="0"/>
               <a:t>…or just </a:t>
             </a:r>
             <a:r>

</xml_diff>

<commit_message>
Updated provisioning slide deck
</commit_message>
<xml_diff>
--- a/01-provision/xconf-sydney-2014-provision.pptx
+++ b/01-provision/xconf-sydney-2014-provision.pptx
@@ -15,6 +15,15 @@
     <p:sldId id="260" r:id="rId9"/>
     <p:sldId id="261" r:id="rId10"/>
     <p:sldId id="265" r:id="rId11"/>
+    <p:sldId id="266" r:id="rId12"/>
+    <p:sldId id="268" r:id="rId13"/>
+    <p:sldId id="274" r:id="rId14"/>
+    <p:sldId id="275" r:id="rId15"/>
+    <p:sldId id="272" r:id="rId16"/>
+    <p:sldId id="271" r:id="rId17"/>
+    <p:sldId id="269" r:id="rId18"/>
+    <p:sldId id="267" r:id="rId19"/>
+    <p:sldId id="270" r:id="rId20"/>
   </p:sldIdLst>
   <p:sldSz cx="9144000" cy="6858000" type="screen4x3"/>
   <p:notesSz cx="6858000" cy="9144000"/>
@@ -3245,15 +3254,7 @@
             </a:r>
             <a:r>
               <a:rPr lang="en-US" dirty="0" smtClean="0"/>
-              <a:t> the </a:t>
-            </a:r>
-            <a:r>
-              <a:rPr lang="en-US" dirty="0" err="1" smtClean="0"/>
-              <a:t>golang</a:t>
-            </a:r>
-            <a:r>
-              <a:rPr lang="en-US" dirty="0" smtClean="0"/>
-              <a:t> </a:t>
+              <a:t> the sample </a:t>
             </a:r>
             <a:r>
               <a:rPr lang="en-US" dirty="0" err="1" smtClean="0"/>
@@ -3261,7 +3262,7 @@
             </a:r>
             <a:r>
               <a:rPr lang="en-US" dirty="0" smtClean="0"/>
-              <a:t> in /</a:t>
+              <a:t> into /</a:t>
             </a:r>
             <a:r>
               <a:rPr lang="en-US" dirty="0" err="1" smtClean="0"/>
@@ -3308,7 +3309,7 @@
             </a:r>
             <a:r>
               <a:rPr lang="en-US" dirty="0" err="1" smtClean="0"/>
-              <a:t>golang.sh</a:t>
+              <a:t>sample.sh</a:t>
             </a:r>
             <a:endParaRPr lang="en-US" dirty="0" smtClean="0"/>
           </a:p>
@@ -3335,7 +3336,7 @@
                 <a:latin typeface="Courier New"/>
                 <a:cs typeface="Courier New"/>
               </a:rPr>
-              <a:t>/local/go/bin:${PATH}</a:t>
+              <a:t>/local/sample/bin:${PATH}</a:t>
             </a:r>
             <a:endParaRPr lang="en-US" sz="2400" dirty="0">
               <a:latin typeface="Courier New"/>
@@ -3354,6 +3355,1430 @@
     <p:extLst>
       <p:ext uri="{BB962C8B-B14F-4D97-AF65-F5344CB8AC3E}">
         <p14:creationId xmlns:p14="http://schemas.microsoft.com/office/powerpoint/2010/main" val="903861105"/>
+      </p:ext>
+    </p:extLst>
+  </p:cSld>
+  <p:clrMapOvr>
+    <a:masterClrMapping/>
+  </p:clrMapOvr>
+  <p:timing>
+    <p:tnLst>
+      <p:par>
+        <p:cTn xmlns:p14="http://schemas.microsoft.com/office/powerpoint/2010/main" id="1" dur="indefinite" restart="never" nodeType="tmRoot"/>
+      </p:par>
+    </p:tnLst>
+  </p:timing>
+</p:sld>
+</file>
+
+<file path=ppt/slides/slide11.xml><?xml version="1.0" encoding="utf-8"?>
+<p:sld xmlns:a="http://schemas.openxmlformats.org/drawingml/2006/main" xmlns:r="http://schemas.openxmlformats.org/officeDocument/2006/relationships" xmlns:p="http://schemas.openxmlformats.org/presentationml/2006/main">
+  <p:cSld>
+    <p:spTree>
+      <p:nvGrpSpPr>
+        <p:cNvPr id="1" name=""/>
+        <p:cNvGrpSpPr/>
+        <p:nvPr/>
+      </p:nvGrpSpPr>
+      <p:grpSpPr>
+        <a:xfrm>
+          <a:off x="0" y="0"/>
+          <a:ext cx="0" cy="0"/>
+          <a:chOff x="0" y="0"/>
+          <a:chExt cx="0" cy="0"/>
+        </a:xfrm>
+      </p:grpSpPr>
+      <p:sp>
+        <p:nvSpPr>
+          <p:cNvPr id="4" name="Title 3"/>
+          <p:cNvSpPr>
+            <a:spLocks noGrp="1"/>
+          </p:cNvSpPr>
+          <p:nvPr>
+            <p:ph type="title"/>
+          </p:nvPr>
+        </p:nvSpPr>
+        <p:spPr/>
+        <p:txBody>
+          <a:bodyPr/>
+          <a:lstStyle/>
+          <a:p>
+            <a:r>
+              <a:rPr lang="en-US" dirty="0" smtClean="0"/>
+              <a:t>Puppet Class</a:t>
+            </a:r>
+            <a:endParaRPr lang="en-US" dirty="0"/>
+          </a:p>
+        </p:txBody>
+      </p:sp>
+      <p:sp>
+        <p:nvSpPr>
+          <p:cNvPr id="5" name="Text Placeholder 4"/>
+          <p:cNvSpPr>
+            <a:spLocks noGrp="1"/>
+          </p:cNvSpPr>
+          <p:nvPr>
+            <p:ph type="body" idx="1"/>
+          </p:nvPr>
+        </p:nvSpPr>
+        <p:spPr/>
+        <p:txBody>
+          <a:bodyPr/>
+          <a:lstStyle/>
+          <a:p>
+            <a:endParaRPr lang="en-US"/>
+          </a:p>
+        </p:txBody>
+      </p:sp>
+    </p:spTree>
+    <p:extLst>
+      <p:ext uri="{BB962C8B-B14F-4D97-AF65-F5344CB8AC3E}">
+        <p14:creationId xmlns:p14="http://schemas.microsoft.com/office/powerpoint/2010/main" val="2801033374"/>
+      </p:ext>
+    </p:extLst>
+  </p:cSld>
+  <p:clrMapOvr>
+    <a:masterClrMapping/>
+  </p:clrMapOvr>
+  <p:timing>
+    <p:tnLst>
+      <p:par>
+        <p:cTn xmlns:p14="http://schemas.microsoft.com/office/powerpoint/2010/main" id="1" dur="indefinite" restart="never" nodeType="tmRoot"/>
+      </p:par>
+    </p:tnLst>
+  </p:timing>
+</p:sld>
+</file>
+
+<file path=ppt/slides/slide12.xml><?xml version="1.0" encoding="utf-8"?>
+<p:sld xmlns:a="http://schemas.openxmlformats.org/drawingml/2006/main" xmlns:r="http://schemas.openxmlformats.org/officeDocument/2006/relationships" xmlns:p="http://schemas.openxmlformats.org/presentationml/2006/main">
+  <p:cSld>
+    <p:spTree>
+      <p:nvGrpSpPr>
+        <p:cNvPr id="1" name=""/>
+        <p:cNvGrpSpPr/>
+        <p:nvPr/>
+      </p:nvGrpSpPr>
+      <p:grpSpPr>
+        <a:xfrm>
+          <a:off x="0" y="0"/>
+          <a:ext cx="0" cy="0"/>
+          <a:chOff x="0" y="0"/>
+          <a:chExt cx="0" cy="0"/>
+        </a:xfrm>
+      </p:grpSpPr>
+      <p:sp>
+        <p:nvSpPr>
+          <p:cNvPr id="4" name="Title 3"/>
+          <p:cNvSpPr>
+            <a:spLocks noGrp="1"/>
+          </p:cNvSpPr>
+          <p:nvPr>
+            <p:ph type="title"/>
+          </p:nvPr>
+        </p:nvSpPr>
+        <p:spPr/>
+        <p:txBody>
+          <a:bodyPr/>
+          <a:lstStyle/>
+          <a:p>
+            <a:r>
+              <a:rPr lang="en-US" dirty="0" smtClean="0"/>
+              <a:t>Class </a:t>
+            </a:r>
+            <a:r>
+              <a:rPr lang="en-US" i="1" dirty="0" smtClean="0"/>
+              <a:t>Definition</a:t>
+            </a:r>
+            <a:endParaRPr lang="en-US" i="1" dirty="0"/>
+          </a:p>
+        </p:txBody>
+      </p:sp>
+      <p:sp>
+        <p:nvSpPr>
+          <p:cNvPr id="5" name="Content Placeholder 4"/>
+          <p:cNvSpPr>
+            <a:spLocks noGrp="1"/>
+          </p:cNvSpPr>
+          <p:nvPr>
+            <p:ph idx="1"/>
+          </p:nvPr>
+        </p:nvSpPr>
+        <p:spPr/>
+        <p:txBody>
+          <a:bodyPr>
+            <a:normAutofit/>
+          </a:bodyPr>
+          <a:lstStyle/>
+          <a:p>
+            <a:pPr marL="0" indent="0">
+              <a:buNone/>
+            </a:pPr>
+            <a:r>
+              <a:rPr lang="en-US" sz="2000" dirty="0" smtClean="0">
+                <a:latin typeface="Courier New"/>
+                <a:cs typeface="Courier New"/>
+              </a:rPr>
+              <a:t>class junk {</a:t>
+            </a:r>
+          </a:p>
+          <a:p>
+            <a:pPr marL="0" indent="0">
+              <a:buNone/>
+            </a:pPr>
+            <a:r>
+              <a:rPr lang="en-US" sz="2000" dirty="0">
+                <a:latin typeface="Courier New"/>
+                <a:cs typeface="Courier New"/>
+              </a:rPr>
+              <a:t> </a:t>
+            </a:r>
+            <a:r>
+              <a:rPr lang="en-US" sz="2000" dirty="0" smtClean="0">
+                <a:latin typeface="Courier New"/>
+                <a:cs typeface="Courier New"/>
+              </a:rPr>
+              <a:t> file { '/</a:t>
+            </a:r>
+            <a:r>
+              <a:rPr lang="en-US" sz="2000" dirty="0" err="1" smtClean="0">
+                <a:latin typeface="Courier New"/>
+                <a:cs typeface="Courier New"/>
+              </a:rPr>
+              <a:t>tmp</a:t>
+            </a:r>
+            <a:r>
+              <a:rPr lang="en-US" sz="2000" dirty="0" smtClean="0">
+                <a:latin typeface="Courier New"/>
+                <a:cs typeface="Courier New"/>
+              </a:rPr>
+              <a:t>/</a:t>
+            </a:r>
+            <a:r>
+              <a:rPr lang="en-US" sz="2000" dirty="0" err="1" smtClean="0">
+                <a:latin typeface="Courier New"/>
+                <a:cs typeface="Courier New"/>
+              </a:rPr>
+              <a:t>junk.txt</a:t>
+            </a:r>
+            <a:r>
+              <a:rPr lang="en-US" sz="2000" dirty="0" smtClean="0">
+                <a:latin typeface="Courier New"/>
+                <a:cs typeface="Courier New"/>
+              </a:rPr>
+              <a:t>':</a:t>
+            </a:r>
+          </a:p>
+          <a:p>
+            <a:pPr marL="0" indent="0">
+              <a:buNone/>
+            </a:pPr>
+            <a:r>
+              <a:rPr lang="en-US" sz="2000" dirty="0">
+                <a:latin typeface="Courier New"/>
+                <a:cs typeface="Courier New"/>
+              </a:rPr>
+              <a:t> </a:t>
+            </a:r>
+            <a:r>
+              <a:rPr lang="en-US" sz="2000" dirty="0" smtClean="0">
+                <a:latin typeface="Courier New"/>
+                <a:cs typeface="Courier New"/>
+              </a:rPr>
+              <a:t>   ensure =&gt; file,</a:t>
+            </a:r>
+          </a:p>
+          <a:p>
+            <a:pPr marL="0" indent="0">
+              <a:buNone/>
+            </a:pPr>
+            <a:r>
+              <a:rPr lang="en-US" sz="2000" dirty="0">
+                <a:latin typeface="Courier New"/>
+                <a:cs typeface="Courier New"/>
+              </a:rPr>
+              <a:t> </a:t>
+            </a:r>
+            <a:r>
+              <a:rPr lang="en-US" sz="2000" dirty="0" smtClean="0">
+                <a:latin typeface="Courier New"/>
+                <a:cs typeface="Courier New"/>
+              </a:rPr>
+              <a:t>   content =&gt; 'Some garbage text.',</a:t>
+            </a:r>
+          </a:p>
+          <a:p>
+            <a:pPr marL="0" indent="0">
+              <a:buNone/>
+            </a:pPr>
+            <a:r>
+              <a:rPr lang="en-US" sz="2000" dirty="0">
+                <a:latin typeface="Courier New"/>
+                <a:cs typeface="Courier New"/>
+              </a:rPr>
+              <a:t> </a:t>
+            </a:r>
+            <a:r>
+              <a:rPr lang="en-US" sz="2000" dirty="0" smtClean="0">
+                <a:latin typeface="Courier New"/>
+                <a:cs typeface="Courier New"/>
+              </a:rPr>
+              <a:t> }</a:t>
+            </a:r>
+          </a:p>
+          <a:p>
+            <a:pPr marL="0" indent="0">
+              <a:buNone/>
+            </a:pPr>
+            <a:r>
+              <a:rPr lang="en-US" sz="2000" dirty="0">
+                <a:latin typeface="Courier New"/>
+                <a:cs typeface="Courier New"/>
+              </a:rPr>
+              <a:t>}</a:t>
+            </a:r>
+            <a:endParaRPr lang="en-US" sz="2000" dirty="0" smtClean="0">
+              <a:latin typeface="Courier New"/>
+              <a:cs typeface="Courier New"/>
+            </a:endParaRPr>
+          </a:p>
+        </p:txBody>
+      </p:sp>
+    </p:spTree>
+    <p:extLst>
+      <p:ext uri="{BB962C8B-B14F-4D97-AF65-F5344CB8AC3E}">
+        <p14:creationId xmlns:p14="http://schemas.microsoft.com/office/powerpoint/2010/main" val="3834580021"/>
+      </p:ext>
+    </p:extLst>
+  </p:cSld>
+  <p:clrMapOvr>
+    <a:masterClrMapping/>
+  </p:clrMapOvr>
+  <p:timing>
+    <p:tnLst>
+      <p:par>
+        <p:cTn xmlns:p14="http://schemas.microsoft.com/office/powerpoint/2010/main" id="1" dur="indefinite" restart="never" nodeType="tmRoot"/>
+      </p:par>
+    </p:tnLst>
+  </p:timing>
+</p:sld>
+</file>
+
+<file path=ppt/slides/slide13.xml><?xml version="1.0" encoding="utf-8"?>
+<p:sld xmlns:a="http://schemas.openxmlformats.org/drawingml/2006/main" xmlns:r="http://schemas.openxmlformats.org/officeDocument/2006/relationships" xmlns:p="http://schemas.openxmlformats.org/presentationml/2006/main">
+  <p:cSld>
+    <p:spTree>
+      <p:nvGrpSpPr>
+        <p:cNvPr id="1" name=""/>
+        <p:cNvGrpSpPr/>
+        <p:nvPr/>
+      </p:nvGrpSpPr>
+      <p:grpSpPr>
+        <a:xfrm>
+          <a:off x="0" y="0"/>
+          <a:ext cx="0" cy="0"/>
+          <a:chOff x="0" y="0"/>
+          <a:chExt cx="0" cy="0"/>
+        </a:xfrm>
+      </p:grpSpPr>
+      <p:sp>
+        <p:nvSpPr>
+          <p:cNvPr id="4" name="Title 3"/>
+          <p:cNvSpPr>
+            <a:spLocks noGrp="1"/>
+          </p:cNvSpPr>
+          <p:nvPr>
+            <p:ph type="title"/>
+          </p:nvPr>
+        </p:nvSpPr>
+        <p:spPr/>
+        <p:txBody>
+          <a:bodyPr/>
+          <a:lstStyle/>
+          <a:p>
+            <a:r>
+              <a:rPr lang="en-US" dirty="0" smtClean="0"/>
+              <a:t>Class </a:t>
+            </a:r>
+            <a:r>
+              <a:rPr lang="en-US" i="1" dirty="0" smtClean="0"/>
+              <a:t>Declaration</a:t>
+            </a:r>
+            <a:endParaRPr lang="en-US" i="1" dirty="0"/>
+          </a:p>
+        </p:txBody>
+      </p:sp>
+      <p:sp>
+        <p:nvSpPr>
+          <p:cNvPr id="5" name="Content Placeholder 4"/>
+          <p:cNvSpPr>
+            <a:spLocks noGrp="1"/>
+          </p:cNvSpPr>
+          <p:nvPr>
+            <p:ph idx="1"/>
+          </p:nvPr>
+        </p:nvSpPr>
+        <p:spPr/>
+        <p:txBody>
+          <a:bodyPr>
+            <a:normAutofit/>
+          </a:bodyPr>
+          <a:lstStyle/>
+          <a:p>
+            <a:pPr marL="0" indent="0">
+              <a:buNone/>
+            </a:pPr>
+            <a:r>
+              <a:rPr lang="en-US" dirty="0" smtClean="0">
+                <a:latin typeface="Courier New"/>
+                <a:cs typeface="Courier New"/>
+              </a:rPr>
+              <a:t>class { '</a:t>
+            </a:r>
+            <a:r>
+              <a:rPr lang="en-US" dirty="0" smtClean="0">
+                <a:latin typeface="Courier New"/>
+                <a:cs typeface="Courier New"/>
+              </a:rPr>
+              <a:t>junk':</a:t>
+            </a:r>
+            <a:r>
+              <a:rPr lang="en-US" dirty="0">
+                <a:latin typeface="Courier New"/>
+                <a:cs typeface="Courier New"/>
+              </a:rPr>
+              <a:t> </a:t>
+            </a:r>
+            <a:r>
+              <a:rPr lang="en-US" dirty="0" smtClean="0">
+                <a:latin typeface="Courier New"/>
+                <a:cs typeface="Courier New"/>
+              </a:rPr>
+              <a:t>}</a:t>
+            </a:r>
+          </a:p>
+          <a:p>
+            <a:pPr marL="0" indent="0">
+              <a:buNone/>
+            </a:pPr>
+            <a:r>
+              <a:rPr lang="en-US" dirty="0" smtClean="0">
+                <a:latin typeface="Courier New"/>
+                <a:cs typeface="Courier New"/>
+              </a:rPr>
+              <a:t>...</a:t>
+            </a:r>
+          </a:p>
+          <a:p>
+            <a:pPr marL="0" indent="0">
+              <a:buNone/>
+            </a:pPr>
+            <a:r>
+              <a:rPr lang="en-US" dirty="0" smtClean="0">
+                <a:latin typeface="Courier New"/>
+                <a:cs typeface="Courier New"/>
+              </a:rPr>
+              <a:t>class { 'junk': }</a:t>
+            </a:r>
+          </a:p>
+          <a:p>
+            <a:pPr marL="0" indent="0">
+              <a:buNone/>
+            </a:pPr>
+            <a:endParaRPr lang="en-US" dirty="0" smtClean="0">
+              <a:latin typeface="Courier New"/>
+              <a:cs typeface="Courier New"/>
+            </a:endParaRPr>
+          </a:p>
+          <a:p>
+            <a:pPr marL="0" indent="0">
+              <a:buNone/>
+            </a:pPr>
+            <a:endParaRPr lang="en-US" dirty="0">
+              <a:latin typeface="Courier New"/>
+              <a:cs typeface="Courier New"/>
+            </a:endParaRPr>
+          </a:p>
+        </p:txBody>
+      </p:sp>
+      <p:pic>
+        <p:nvPicPr>
+          <p:cNvPr id="2" name="Picture 1"/>
+          <p:cNvPicPr>
+            <a:picLocks noChangeAspect="1"/>
+          </p:cNvPicPr>
+          <p:nvPr/>
+        </p:nvPicPr>
+        <p:blipFill>
+          <a:blip r:embed="rId2"/>
+          <a:stretch>
+            <a:fillRect/>
+          </a:stretch>
+        </p:blipFill>
+        <p:spPr>
+          <a:xfrm>
+            <a:off x="546100" y="3759199"/>
+            <a:ext cx="8140700" cy="355571"/>
+          </a:xfrm>
+          <a:prstGeom prst="rect">
+            <a:avLst/>
+          </a:prstGeom>
+        </p:spPr>
+      </p:pic>
+    </p:spTree>
+    <p:extLst>
+      <p:ext uri="{BB962C8B-B14F-4D97-AF65-F5344CB8AC3E}">
+        <p14:creationId xmlns:p14="http://schemas.microsoft.com/office/powerpoint/2010/main" val="2707467741"/>
+      </p:ext>
+    </p:extLst>
+  </p:cSld>
+  <p:clrMapOvr>
+    <a:masterClrMapping/>
+  </p:clrMapOvr>
+  <p:timing>
+    <p:tnLst>
+      <p:par>
+        <p:cTn xmlns:p14="http://schemas.microsoft.com/office/powerpoint/2010/main" id="1" dur="indefinite" restart="never" nodeType="tmRoot">
+          <p:childTnLst>
+            <p:seq concurrent="1" nextAc="seek">
+              <p:cTn id="2" dur="indefinite" nodeType="mainSeq">
+                <p:childTnLst>
+                  <p:par>
+                    <p:cTn id="3" fill="hold">
+                      <p:stCondLst>
+                        <p:cond delay="indefinite"/>
+                      </p:stCondLst>
+                      <p:childTnLst>
+                        <p:par>
+                          <p:cTn id="4" fill="hold">
+                            <p:stCondLst>
+                              <p:cond delay="0"/>
+                            </p:stCondLst>
+                            <p:childTnLst>
+                              <p:par>
+                                <p:cTn id="5" presetID="1" presetClass="entr" presetSubtype="0" fill="hold" nodeType="clickEffect">
+                                  <p:stCondLst>
+                                    <p:cond delay="0"/>
+                                  </p:stCondLst>
+                                  <p:childTnLst>
+                                    <p:set>
+                                      <p:cBhvr>
+                                        <p:cTn id="6" dur="1" fill="hold">
+                                          <p:stCondLst>
+                                            <p:cond delay="0"/>
+                                          </p:stCondLst>
+                                        </p:cTn>
+                                        <p:tgtEl>
+                                          <p:spTgt spid="5">
+                                            <p:txEl>
+                                              <p:pRg st="1" end="1"/>
+                                            </p:txEl>
+                                          </p:spTgt>
+                                        </p:tgtEl>
+                                        <p:attrNameLst>
+                                          <p:attrName>style.visibility</p:attrName>
+                                        </p:attrNameLst>
+                                      </p:cBhvr>
+                                      <p:to>
+                                        <p:strVal val="visible"/>
+                                      </p:to>
+                                    </p:set>
+                                  </p:childTnLst>
+                                </p:cTn>
+                              </p:par>
+                              <p:par>
+                                <p:cTn id="7" presetID="1" presetClass="entr" presetSubtype="0" fill="hold" nodeType="withEffect">
+                                  <p:stCondLst>
+                                    <p:cond delay="0"/>
+                                  </p:stCondLst>
+                                  <p:childTnLst>
+                                    <p:set>
+                                      <p:cBhvr>
+                                        <p:cTn id="8" dur="1" fill="hold">
+                                          <p:stCondLst>
+                                            <p:cond delay="0"/>
+                                          </p:stCondLst>
+                                        </p:cTn>
+                                        <p:tgtEl>
+                                          <p:spTgt spid="5">
+                                            <p:txEl>
+                                              <p:pRg st="2" end="2"/>
+                                            </p:txEl>
+                                          </p:spTgt>
+                                        </p:tgtEl>
+                                        <p:attrNameLst>
+                                          <p:attrName>style.visibility</p:attrName>
+                                        </p:attrNameLst>
+                                      </p:cBhvr>
+                                      <p:to>
+                                        <p:strVal val="visible"/>
+                                      </p:to>
+                                    </p:set>
+                                  </p:childTnLst>
+                                </p:cTn>
+                              </p:par>
+                            </p:childTnLst>
+                          </p:cTn>
+                        </p:par>
+                      </p:childTnLst>
+                    </p:cTn>
+                  </p:par>
+                  <p:par>
+                    <p:cTn id="9" fill="hold">
+                      <p:stCondLst>
+                        <p:cond delay="indefinite"/>
+                      </p:stCondLst>
+                      <p:childTnLst>
+                        <p:par>
+                          <p:cTn id="10" fill="hold">
+                            <p:stCondLst>
+                              <p:cond delay="0"/>
+                            </p:stCondLst>
+                            <p:childTnLst>
+                              <p:par>
+                                <p:cTn id="11" presetID="1" presetClass="entr" presetSubtype="0" fill="hold" nodeType="clickEffect">
+                                  <p:stCondLst>
+                                    <p:cond delay="0"/>
+                                  </p:stCondLst>
+                                  <p:childTnLst>
+                                    <p:set>
+                                      <p:cBhvr>
+                                        <p:cTn id="12" dur="1" fill="hold">
+                                          <p:stCondLst>
+                                            <p:cond delay="0"/>
+                                          </p:stCondLst>
+                                        </p:cTn>
+                                        <p:tgtEl>
+                                          <p:spTgt spid="2"/>
+                                        </p:tgtEl>
+                                        <p:attrNameLst>
+                                          <p:attrName>style.visibility</p:attrName>
+                                        </p:attrNameLst>
+                                      </p:cBhvr>
+                                      <p:to>
+                                        <p:strVal val="visible"/>
+                                      </p:to>
+                                    </p:set>
+                                  </p:childTnLst>
+                                </p:cTn>
+                              </p:par>
+                            </p:childTnLst>
+                          </p:cTn>
+                        </p:par>
+                      </p:childTnLst>
+                    </p:cTn>
+                  </p:par>
+                </p:childTnLst>
+              </p:cTn>
+              <p:prevCondLst>
+                <p:cond evt="onPrev" delay="0">
+                  <p:tgtEl>
+                    <p:sldTgt/>
+                  </p:tgtEl>
+                </p:cond>
+              </p:prevCondLst>
+              <p:nextCondLst>
+                <p:cond evt="onNext" delay="0">
+                  <p:tgtEl>
+                    <p:sldTgt/>
+                  </p:tgtEl>
+                </p:cond>
+              </p:nextCondLst>
+            </p:seq>
+          </p:childTnLst>
+        </p:cTn>
+      </p:par>
+    </p:tnLst>
+  </p:timing>
+</p:sld>
+</file>
+
+<file path=ppt/slides/slide14.xml><?xml version="1.0" encoding="utf-8"?>
+<p:sld xmlns:a="http://schemas.openxmlformats.org/drawingml/2006/main" xmlns:r="http://schemas.openxmlformats.org/officeDocument/2006/relationships" xmlns:p="http://schemas.openxmlformats.org/presentationml/2006/main">
+  <p:cSld>
+    <p:spTree>
+      <p:nvGrpSpPr>
+        <p:cNvPr id="1" name=""/>
+        <p:cNvGrpSpPr/>
+        <p:nvPr/>
+      </p:nvGrpSpPr>
+      <p:grpSpPr>
+        <a:xfrm>
+          <a:off x="0" y="0"/>
+          <a:ext cx="0" cy="0"/>
+          <a:chOff x="0" y="0"/>
+          <a:chExt cx="0" cy="0"/>
+        </a:xfrm>
+      </p:grpSpPr>
+      <p:sp>
+        <p:nvSpPr>
+          <p:cNvPr id="4" name="Title 3"/>
+          <p:cNvSpPr>
+            <a:spLocks noGrp="1"/>
+          </p:cNvSpPr>
+          <p:nvPr>
+            <p:ph type="title"/>
+          </p:nvPr>
+        </p:nvSpPr>
+        <p:spPr/>
+        <p:txBody>
+          <a:bodyPr/>
+          <a:lstStyle/>
+          <a:p>
+            <a:r>
+              <a:rPr lang="en-US" dirty="0" smtClean="0"/>
+              <a:t>The </a:t>
+            </a:r>
+            <a:r>
+              <a:rPr lang="en-US" i="1" dirty="0" err="1" smtClean="0"/>
+              <a:t>lamp_stack</a:t>
+            </a:r>
+            <a:r>
+              <a:rPr lang="en-US" dirty="0" smtClean="0"/>
+              <a:t> class</a:t>
+            </a:r>
+            <a:endParaRPr lang="en-US" dirty="0"/>
+          </a:p>
+        </p:txBody>
+      </p:sp>
+      <p:sp>
+        <p:nvSpPr>
+          <p:cNvPr id="5" name="Content Placeholder 4"/>
+          <p:cNvSpPr>
+            <a:spLocks noGrp="1"/>
+          </p:cNvSpPr>
+          <p:nvPr>
+            <p:ph idx="1"/>
+          </p:nvPr>
+        </p:nvSpPr>
+        <p:spPr/>
+        <p:txBody>
+          <a:bodyPr>
+            <a:normAutofit/>
+          </a:bodyPr>
+          <a:lstStyle/>
+          <a:p>
+            <a:pPr marL="0" indent="0">
+              <a:buNone/>
+            </a:pPr>
+            <a:r>
+              <a:rPr lang="en-US" dirty="0" smtClean="0">
+                <a:latin typeface="Calibri"/>
+                <a:cs typeface="Calibri"/>
+              </a:rPr>
+              <a:t>Packages:</a:t>
+            </a:r>
+          </a:p>
+          <a:p>
+            <a:r>
+              <a:rPr lang="en-US" dirty="0" err="1" smtClean="0">
+                <a:cs typeface="Calibri"/>
+              </a:rPr>
+              <a:t>httpd</a:t>
+            </a:r>
+            <a:r>
+              <a:rPr lang="en-US" dirty="0" smtClean="0">
+                <a:cs typeface="Calibri"/>
+              </a:rPr>
+              <a:t>, </a:t>
+            </a:r>
+            <a:r>
+              <a:rPr lang="en-US" dirty="0" err="1" smtClean="0">
+                <a:cs typeface="Calibri"/>
+              </a:rPr>
+              <a:t>mysql</a:t>
+            </a:r>
+            <a:r>
+              <a:rPr lang="en-US" dirty="0" smtClean="0">
+                <a:cs typeface="Calibri"/>
+              </a:rPr>
+              <a:t>-server, </a:t>
+            </a:r>
+            <a:r>
+              <a:rPr lang="en-US" dirty="0" err="1" smtClean="0">
+                <a:cs typeface="Calibri"/>
+              </a:rPr>
+              <a:t>mysql</a:t>
+            </a:r>
+            <a:r>
+              <a:rPr lang="en-US" dirty="0" smtClean="0">
+                <a:cs typeface="Calibri"/>
+              </a:rPr>
+              <a:t>, </a:t>
+            </a:r>
+            <a:r>
+              <a:rPr lang="en-US" dirty="0" err="1" smtClean="0">
+                <a:cs typeface="Calibri"/>
+              </a:rPr>
+              <a:t>php</a:t>
+            </a:r>
+            <a:r>
+              <a:rPr lang="en-US" dirty="0" smtClean="0">
+                <a:cs typeface="Calibri"/>
+              </a:rPr>
+              <a:t>, </a:t>
+            </a:r>
+            <a:r>
+              <a:rPr lang="en-US" dirty="0" err="1" smtClean="0">
+                <a:cs typeface="Calibri"/>
+              </a:rPr>
+              <a:t>php</a:t>
+            </a:r>
+            <a:r>
+              <a:rPr lang="en-US" dirty="0" err="1">
+                <a:cs typeface="Calibri"/>
+              </a:rPr>
+              <a:t>-</a:t>
+            </a:r>
+            <a:r>
+              <a:rPr lang="en-US" dirty="0" err="1" smtClean="0">
+                <a:cs typeface="Calibri"/>
+              </a:rPr>
+              <a:t>mysql</a:t>
+            </a:r>
+            <a:endParaRPr lang="en-US" dirty="0" smtClean="0">
+              <a:cs typeface="Calibri"/>
+            </a:endParaRPr>
+          </a:p>
+          <a:p>
+            <a:pPr marL="0" indent="0">
+              <a:buNone/>
+            </a:pPr>
+            <a:r>
+              <a:rPr lang="en-US" dirty="0" smtClean="0">
+                <a:cs typeface="Calibri"/>
+              </a:rPr>
+              <a:t>Services</a:t>
+            </a:r>
+            <a:endParaRPr lang="en-US" dirty="0">
+              <a:cs typeface="Calibri"/>
+            </a:endParaRPr>
+          </a:p>
+          <a:p>
+            <a:r>
+              <a:rPr lang="en-US" dirty="0" err="1" smtClean="0">
+                <a:cs typeface="Calibri"/>
+              </a:rPr>
+              <a:t>httpd</a:t>
+            </a:r>
+            <a:r>
+              <a:rPr lang="en-US" dirty="0" smtClean="0">
+                <a:cs typeface="Calibri"/>
+              </a:rPr>
+              <a:t>, </a:t>
+            </a:r>
+            <a:r>
+              <a:rPr lang="en-US" dirty="0" err="1" smtClean="0">
+                <a:cs typeface="Calibri"/>
+              </a:rPr>
+              <a:t>mysqld</a:t>
+            </a:r>
+            <a:endParaRPr lang="en-US" dirty="0" smtClean="0">
+              <a:cs typeface="Calibri"/>
+            </a:endParaRPr>
+          </a:p>
+          <a:p>
+            <a:pPr marL="0" indent="0">
+              <a:buNone/>
+            </a:pPr>
+            <a:r>
+              <a:rPr lang="en-US" dirty="0" smtClean="0">
+                <a:cs typeface="Calibri"/>
+              </a:rPr>
+              <a:t>File /</a:t>
+            </a:r>
+            <a:r>
+              <a:rPr lang="en-US" dirty="0" err="1" smtClean="0">
+                <a:cs typeface="Calibri"/>
+              </a:rPr>
+              <a:t>var</a:t>
+            </a:r>
+            <a:r>
+              <a:rPr lang="en-US" dirty="0" smtClean="0">
+                <a:cs typeface="Calibri"/>
+              </a:rPr>
+              <a:t>/www/html/</a:t>
+            </a:r>
+            <a:r>
+              <a:rPr lang="en-US" dirty="0" err="1" smtClean="0">
+                <a:cs typeface="Calibri"/>
+              </a:rPr>
+              <a:t>test.php</a:t>
+            </a:r>
+            <a:endParaRPr lang="en-US" dirty="0" smtClean="0">
+              <a:cs typeface="Calibri"/>
+            </a:endParaRPr>
+          </a:p>
+          <a:p>
+            <a:r>
+              <a:rPr lang="en-US" smtClean="0">
+                <a:cs typeface="Calibri"/>
+              </a:rPr>
+              <a:t>Content</a:t>
+            </a:r>
+            <a:r>
+              <a:rPr lang="en-US" dirty="0" smtClean="0">
+                <a:cs typeface="Calibri"/>
+              </a:rPr>
+              <a:t>:</a:t>
+            </a:r>
+            <a:br>
+              <a:rPr lang="en-US" dirty="0" smtClean="0">
+                <a:cs typeface="Calibri"/>
+              </a:rPr>
+            </a:br>
+            <a:r>
+              <a:rPr lang="en-US" sz="1600" dirty="0" smtClean="0">
+                <a:latin typeface="Courier New"/>
+                <a:cs typeface="Courier New"/>
+              </a:rPr>
+              <a:t>&lt;html&gt;&lt;body&gt;&lt;?</a:t>
+            </a:r>
+            <a:r>
+              <a:rPr lang="en-US" sz="1600" dirty="0" err="1" smtClean="0">
+                <a:latin typeface="Courier New"/>
+                <a:cs typeface="Courier New"/>
+              </a:rPr>
+              <a:t>php</a:t>
+            </a:r>
+            <a:r>
+              <a:rPr lang="en-US" sz="1600" dirty="0" smtClean="0">
+                <a:latin typeface="Courier New"/>
+                <a:cs typeface="Courier New"/>
+              </a:rPr>
+              <a:t> echo "We have lift off!"; ?&gt;&lt;/body&gt;&lt;/html&gt;</a:t>
+            </a:r>
+            <a:endParaRPr lang="en-US" sz="1600" dirty="0">
+              <a:latin typeface="Courier New"/>
+              <a:cs typeface="Courier New"/>
+            </a:endParaRPr>
+          </a:p>
+          <a:p>
+            <a:endParaRPr lang="en-US" dirty="0" smtClean="0">
+              <a:cs typeface="Calibri"/>
+            </a:endParaRPr>
+          </a:p>
+        </p:txBody>
+      </p:sp>
+    </p:spTree>
+    <p:extLst>
+      <p:ext uri="{BB962C8B-B14F-4D97-AF65-F5344CB8AC3E}">
+        <p14:creationId xmlns:p14="http://schemas.microsoft.com/office/powerpoint/2010/main" val="885279873"/>
+      </p:ext>
+    </p:extLst>
+  </p:cSld>
+  <p:clrMapOvr>
+    <a:masterClrMapping/>
+  </p:clrMapOvr>
+  <p:timing>
+    <p:tnLst>
+      <p:par>
+        <p:cTn xmlns:p14="http://schemas.microsoft.com/office/powerpoint/2010/main" id="1" dur="indefinite" restart="never" nodeType="tmRoot"/>
+      </p:par>
+    </p:tnLst>
+  </p:timing>
+</p:sld>
+</file>
+
+<file path=ppt/slides/slide15.xml><?xml version="1.0" encoding="utf-8"?>
+<p:sld xmlns:a="http://schemas.openxmlformats.org/drawingml/2006/main" xmlns:r="http://schemas.openxmlformats.org/officeDocument/2006/relationships" xmlns:p="http://schemas.openxmlformats.org/presentationml/2006/main">
+  <p:cSld>
+    <p:spTree>
+      <p:nvGrpSpPr>
+        <p:cNvPr id="1" name=""/>
+        <p:cNvGrpSpPr/>
+        <p:nvPr/>
+      </p:nvGrpSpPr>
+      <p:grpSpPr>
+        <a:xfrm>
+          <a:off x="0" y="0"/>
+          <a:ext cx="0" cy="0"/>
+          <a:chOff x="0" y="0"/>
+          <a:chExt cx="0" cy="0"/>
+        </a:xfrm>
+      </p:grpSpPr>
+      <p:sp>
+        <p:nvSpPr>
+          <p:cNvPr id="4" name="Title 3"/>
+          <p:cNvSpPr>
+            <a:spLocks noGrp="1"/>
+          </p:cNvSpPr>
+          <p:nvPr>
+            <p:ph type="title"/>
+          </p:nvPr>
+        </p:nvSpPr>
+        <p:spPr/>
+        <p:txBody>
+          <a:bodyPr/>
+          <a:lstStyle/>
+          <a:p>
+            <a:r>
+              <a:rPr lang="en-US" dirty="0" smtClean="0"/>
+              <a:t>Puppet Modules</a:t>
+            </a:r>
+            <a:endParaRPr lang="en-US" dirty="0"/>
+          </a:p>
+        </p:txBody>
+      </p:sp>
+      <p:sp>
+        <p:nvSpPr>
+          <p:cNvPr id="5" name="Text Placeholder 4"/>
+          <p:cNvSpPr>
+            <a:spLocks noGrp="1"/>
+          </p:cNvSpPr>
+          <p:nvPr>
+            <p:ph type="body" idx="1"/>
+          </p:nvPr>
+        </p:nvSpPr>
+        <p:spPr/>
+        <p:txBody>
+          <a:bodyPr/>
+          <a:lstStyle/>
+          <a:p>
+            <a:endParaRPr lang="en-US"/>
+          </a:p>
+        </p:txBody>
+      </p:sp>
+    </p:spTree>
+    <p:extLst>
+      <p:ext uri="{BB962C8B-B14F-4D97-AF65-F5344CB8AC3E}">
+        <p14:creationId xmlns:p14="http://schemas.microsoft.com/office/powerpoint/2010/main" val="2406150601"/>
+      </p:ext>
+    </p:extLst>
+  </p:cSld>
+  <p:clrMapOvr>
+    <a:masterClrMapping/>
+  </p:clrMapOvr>
+  <p:timing>
+    <p:tnLst>
+      <p:par>
+        <p:cTn xmlns:p14="http://schemas.microsoft.com/office/powerpoint/2010/main" id="1" dur="indefinite" restart="never" nodeType="tmRoot"/>
+      </p:par>
+    </p:tnLst>
+  </p:timing>
+</p:sld>
+</file>
+
+<file path=ppt/slides/slide16.xml><?xml version="1.0" encoding="utf-8"?>
+<p:sld xmlns:a="http://schemas.openxmlformats.org/drawingml/2006/main" xmlns:r="http://schemas.openxmlformats.org/officeDocument/2006/relationships" xmlns:p="http://schemas.openxmlformats.org/presentationml/2006/main">
+  <p:cSld>
+    <p:spTree>
+      <p:nvGrpSpPr>
+        <p:cNvPr id="1" name=""/>
+        <p:cNvGrpSpPr/>
+        <p:nvPr/>
+      </p:nvGrpSpPr>
+      <p:grpSpPr>
+        <a:xfrm>
+          <a:off x="0" y="0"/>
+          <a:ext cx="0" cy="0"/>
+          <a:chOff x="0" y="0"/>
+          <a:chExt cx="0" cy="0"/>
+        </a:xfrm>
+      </p:grpSpPr>
+      <p:sp>
+        <p:nvSpPr>
+          <p:cNvPr id="4" name="Title 3"/>
+          <p:cNvSpPr>
+            <a:spLocks noGrp="1"/>
+          </p:cNvSpPr>
+          <p:nvPr>
+            <p:ph type="title"/>
+          </p:nvPr>
+        </p:nvSpPr>
+        <p:spPr/>
+        <p:txBody>
+          <a:bodyPr/>
+          <a:lstStyle/>
+          <a:p>
+            <a:r>
+              <a:rPr lang="en-US" dirty="0" smtClean="0"/>
+              <a:t>Module Structure</a:t>
+            </a:r>
+            <a:endParaRPr lang="en-US" dirty="0"/>
+          </a:p>
+        </p:txBody>
+      </p:sp>
+      <p:sp>
+        <p:nvSpPr>
+          <p:cNvPr id="5" name="Content Placeholder 4"/>
+          <p:cNvSpPr>
+            <a:spLocks noGrp="1"/>
+          </p:cNvSpPr>
+          <p:nvPr>
+            <p:ph idx="1"/>
+          </p:nvPr>
+        </p:nvSpPr>
+        <p:spPr/>
+        <p:txBody>
+          <a:bodyPr/>
+          <a:lstStyle/>
+          <a:p>
+            <a:r>
+              <a:rPr lang="en-US" dirty="0" smtClean="0"/>
+              <a:t>Module Name</a:t>
+            </a:r>
+          </a:p>
+          <a:p>
+            <a:pPr lvl="1"/>
+            <a:r>
+              <a:rPr lang="en-US" dirty="0" smtClean="0"/>
+              <a:t>manifests</a:t>
+            </a:r>
+          </a:p>
+          <a:p>
+            <a:pPr lvl="1"/>
+            <a:r>
+              <a:rPr lang="en-US" dirty="0" smtClean="0"/>
+              <a:t>files</a:t>
+            </a:r>
+          </a:p>
+          <a:p>
+            <a:pPr lvl="1"/>
+            <a:r>
+              <a:rPr lang="en-US" dirty="0" smtClean="0"/>
+              <a:t>templates</a:t>
+            </a:r>
+          </a:p>
+          <a:p>
+            <a:pPr lvl="1"/>
+            <a:r>
+              <a:rPr lang="en-US" dirty="0" smtClean="0"/>
+              <a:t>…</a:t>
+            </a:r>
+          </a:p>
+          <a:p>
+            <a:endParaRPr lang="en-US" dirty="0"/>
+          </a:p>
+          <a:p>
+            <a:pPr marL="0" indent="0">
+              <a:buNone/>
+            </a:pPr>
+            <a:r>
+              <a:rPr lang="en-US" sz="1800" dirty="0" smtClean="0">
+                <a:hlinkClick r:id="rId2"/>
+              </a:rPr>
+              <a:t>https://docs.puppetlabs.com/puppet/latest/reference/modules_fundamentals.html</a:t>
+            </a:r>
+            <a:r>
+              <a:rPr lang="en-US" sz="1800" dirty="0" smtClean="0"/>
+              <a:t> </a:t>
+            </a:r>
+            <a:endParaRPr lang="en-US" sz="1800" dirty="0"/>
+          </a:p>
+        </p:txBody>
+      </p:sp>
+    </p:spTree>
+    <p:extLst>
+      <p:ext uri="{BB962C8B-B14F-4D97-AF65-F5344CB8AC3E}">
+        <p14:creationId xmlns:p14="http://schemas.microsoft.com/office/powerpoint/2010/main" val="3083997489"/>
+      </p:ext>
+    </p:extLst>
+  </p:cSld>
+  <p:clrMapOvr>
+    <a:masterClrMapping/>
+  </p:clrMapOvr>
+  <p:timing>
+    <p:tnLst>
+      <p:par>
+        <p:cTn xmlns:p14="http://schemas.microsoft.com/office/powerpoint/2010/main" id="1" dur="indefinite" restart="never" nodeType="tmRoot"/>
+      </p:par>
+    </p:tnLst>
+  </p:timing>
+</p:sld>
+</file>
+
+<file path=ppt/slides/slide17.xml><?xml version="1.0" encoding="utf-8"?>
+<p:sld xmlns:a="http://schemas.openxmlformats.org/drawingml/2006/main" xmlns:r="http://schemas.openxmlformats.org/officeDocument/2006/relationships" xmlns:p="http://schemas.openxmlformats.org/presentationml/2006/main">
+  <p:cSld>
+    <p:spTree>
+      <p:nvGrpSpPr>
+        <p:cNvPr id="1" name=""/>
+        <p:cNvGrpSpPr/>
+        <p:nvPr/>
+      </p:nvGrpSpPr>
+      <p:grpSpPr>
+        <a:xfrm>
+          <a:off x="0" y="0"/>
+          <a:ext cx="0" cy="0"/>
+          <a:chOff x="0" y="0"/>
+          <a:chExt cx="0" cy="0"/>
+        </a:xfrm>
+      </p:grpSpPr>
+      <p:sp>
+        <p:nvSpPr>
+          <p:cNvPr id="2" name="Title 1"/>
+          <p:cNvSpPr>
+            <a:spLocks noGrp="1"/>
+          </p:cNvSpPr>
+          <p:nvPr>
+            <p:ph type="title"/>
+          </p:nvPr>
+        </p:nvSpPr>
+        <p:spPr/>
+        <p:txBody>
+          <a:bodyPr/>
+          <a:lstStyle/>
+          <a:p>
+            <a:r>
+              <a:rPr lang="en-US" dirty="0" smtClean="0"/>
+              <a:t>The </a:t>
+            </a:r>
+            <a:r>
+              <a:rPr lang="en-US" dirty="0" err="1" smtClean="0"/>
+              <a:t>nfs</a:t>
+            </a:r>
+            <a:r>
+              <a:rPr lang="en-US" dirty="0" smtClean="0"/>
+              <a:t> Module</a:t>
+            </a:r>
+            <a:endParaRPr lang="en-US" dirty="0"/>
+          </a:p>
+        </p:txBody>
+      </p:sp>
+      <p:sp>
+        <p:nvSpPr>
+          <p:cNvPr id="3" name="Content Placeholder 2"/>
+          <p:cNvSpPr>
+            <a:spLocks noGrp="1"/>
+          </p:cNvSpPr>
+          <p:nvPr>
+            <p:ph idx="1"/>
+          </p:nvPr>
+        </p:nvSpPr>
+        <p:spPr/>
+        <p:txBody>
+          <a:bodyPr/>
+          <a:lstStyle/>
+          <a:p>
+            <a:r>
+              <a:rPr lang="en-US" dirty="0" smtClean="0"/>
+              <a:t>Server:</a:t>
+            </a:r>
+          </a:p>
+          <a:p>
+            <a:pPr lvl="1"/>
+            <a:r>
+              <a:rPr lang="en-US" dirty="0" smtClean="0"/>
+              <a:t>Packages: </a:t>
+            </a:r>
+            <a:r>
+              <a:rPr lang="en-US" dirty="0" err="1" smtClean="0"/>
+              <a:t>nfs-utils</a:t>
+            </a:r>
+            <a:r>
+              <a:rPr lang="en-US" dirty="0" smtClean="0"/>
+              <a:t>, </a:t>
+            </a:r>
+            <a:r>
+              <a:rPr lang="en-US" dirty="0" err="1" smtClean="0"/>
+              <a:t>rpcbind</a:t>
+            </a:r>
+            <a:endParaRPr lang="en-US" dirty="0" smtClean="0"/>
+          </a:p>
+          <a:p>
+            <a:pPr lvl="1"/>
+            <a:r>
+              <a:rPr lang="en-US" dirty="0" smtClean="0"/>
+              <a:t>Services: </a:t>
+            </a:r>
+            <a:r>
+              <a:rPr lang="en-US" dirty="0" err="1" smtClean="0"/>
+              <a:t>rpcbind</a:t>
+            </a:r>
+            <a:r>
+              <a:rPr lang="en-US" dirty="0" smtClean="0"/>
+              <a:t>, </a:t>
+            </a:r>
+            <a:r>
+              <a:rPr lang="en-US" dirty="0" err="1" smtClean="0"/>
+              <a:t>nfs</a:t>
+            </a:r>
+            <a:endParaRPr lang="en-US" dirty="0" smtClean="0"/>
+          </a:p>
+          <a:p>
+            <a:r>
+              <a:rPr lang="en-US" dirty="0" smtClean="0"/>
+              <a:t>Client:</a:t>
+            </a:r>
+          </a:p>
+          <a:p>
+            <a:pPr lvl="1"/>
+            <a:r>
+              <a:rPr lang="en-US" dirty="0" smtClean="0"/>
+              <a:t>Services: </a:t>
+            </a:r>
+            <a:r>
+              <a:rPr lang="en-US" dirty="0" err="1" smtClean="0"/>
+              <a:t>netfs</a:t>
+            </a:r>
+            <a:endParaRPr lang="en-US" dirty="0"/>
+          </a:p>
+        </p:txBody>
+      </p:sp>
+    </p:spTree>
+    <p:extLst>
+      <p:ext uri="{BB962C8B-B14F-4D97-AF65-F5344CB8AC3E}">
+        <p14:creationId xmlns:p14="http://schemas.microsoft.com/office/powerpoint/2010/main" val="163414872"/>
+      </p:ext>
+    </p:extLst>
+  </p:cSld>
+  <p:clrMapOvr>
+    <a:masterClrMapping/>
+  </p:clrMapOvr>
+</p:sld>
+</file>
+
+<file path=ppt/slides/slide18.xml><?xml version="1.0" encoding="utf-8"?>
+<p:sld xmlns:a="http://schemas.openxmlformats.org/drawingml/2006/main" xmlns:r="http://schemas.openxmlformats.org/officeDocument/2006/relationships" xmlns:p="http://schemas.openxmlformats.org/presentationml/2006/main">
+  <p:cSld>
+    <p:spTree>
+      <p:nvGrpSpPr>
+        <p:cNvPr id="1" name=""/>
+        <p:cNvGrpSpPr/>
+        <p:nvPr/>
+      </p:nvGrpSpPr>
+      <p:grpSpPr>
+        <a:xfrm>
+          <a:off x="0" y="0"/>
+          <a:ext cx="0" cy="0"/>
+          <a:chOff x="0" y="0"/>
+          <a:chExt cx="0" cy="0"/>
+        </a:xfrm>
+      </p:grpSpPr>
+      <p:sp>
+        <p:nvSpPr>
+          <p:cNvPr id="4" name="Title 3"/>
+          <p:cNvSpPr>
+            <a:spLocks noGrp="1"/>
+          </p:cNvSpPr>
+          <p:nvPr>
+            <p:ph type="title"/>
+          </p:nvPr>
+        </p:nvSpPr>
+        <p:spPr/>
+        <p:txBody>
+          <a:bodyPr/>
+          <a:lstStyle/>
+          <a:p>
+            <a:r>
+              <a:rPr lang="en-US" dirty="0" err="1" smtClean="0"/>
+              <a:t>Externalise</a:t>
+            </a:r>
+            <a:r>
+              <a:rPr lang="en-US" dirty="0" smtClean="0"/>
+              <a:t> Configuration Using </a:t>
+            </a:r>
+            <a:r>
+              <a:rPr lang="en-US" dirty="0" err="1" smtClean="0"/>
+              <a:t>Hiera</a:t>
+            </a:r>
+            <a:endParaRPr lang="en-US" dirty="0"/>
+          </a:p>
+        </p:txBody>
+      </p:sp>
+      <p:sp>
+        <p:nvSpPr>
+          <p:cNvPr id="5" name="Text Placeholder 4"/>
+          <p:cNvSpPr>
+            <a:spLocks noGrp="1"/>
+          </p:cNvSpPr>
+          <p:nvPr>
+            <p:ph type="body" idx="1"/>
+          </p:nvPr>
+        </p:nvSpPr>
+        <p:spPr/>
+        <p:txBody>
+          <a:bodyPr/>
+          <a:lstStyle/>
+          <a:p>
+            <a:endParaRPr lang="en-US"/>
+          </a:p>
+        </p:txBody>
+      </p:sp>
+    </p:spTree>
+    <p:extLst>
+      <p:ext uri="{BB962C8B-B14F-4D97-AF65-F5344CB8AC3E}">
+        <p14:creationId xmlns:p14="http://schemas.microsoft.com/office/powerpoint/2010/main" val="1738170492"/>
+      </p:ext>
+    </p:extLst>
+  </p:cSld>
+  <p:clrMapOvr>
+    <a:masterClrMapping/>
+  </p:clrMapOvr>
+  <p:timing>
+    <p:tnLst>
+      <p:par>
+        <p:cTn xmlns:p14="http://schemas.microsoft.com/office/powerpoint/2010/main" id="1" dur="indefinite" restart="never" nodeType="tmRoot"/>
+      </p:par>
+    </p:tnLst>
+  </p:timing>
+</p:sld>
+</file>
+
+<file path=ppt/slides/slide19.xml><?xml version="1.0" encoding="utf-8"?>
+<p:sld xmlns:a="http://schemas.openxmlformats.org/drawingml/2006/main" xmlns:r="http://schemas.openxmlformats.org/officeDocument/2006/relationships" xmlns:p="http://schemas.openxmlformats.org/presentationml/2006/main">
+  <p:cSld>
+    <p:spTree>
+      <p:nvGrpSpPr>
+        <p:cNvPr id="1" name=""/>
+        <p:cNvGrpSpPr/>
+        <p:nvPr/>
+      </p:nvGrpSpPr>
+      <p:grpSpPr>
+        <a:xfrm>
+          <a:off x="0" y="0"/>
+          <a:ext cx="0" cy="0"/>
+          <a:chOff x="0" y="0"/>
+          <a:chExt cx="0" cy="0"/>
+        </a:xfrm>
+      </p:grpSpPr>
+      <p:sp>
+        <p:nvSpPr>
+          <p:cNvPr id="4" name="Title 3"/>
+          <p:cNvSpPr>
+            <a:spLocks noGrp="1"/>
+          </p:cNvSpPr>
+          <p:nvPr>
+            <p:ph type="title"/>
+          </p:nvPr>
+        </p:nvSpPr>
+        <p:spPr/>
+        <p:txBody>
+          <a:bodyPr/>
+          <a:lstStyle/>
+          <a:p>
+            <a:r>
+              <a:rPr lang="en-US" dirty="0" smtClean="0"/>
+              <a:t>External Node Classification</a:t>
+            </a:r>
+            <a:endParaRPr lang="en-US" dirty="0"/>
+          </a:p>
+        </p:txBody>
+      </p:sp>
+      <p:sp>
+        <p:nvSpPr>
+          <p:cNvPr id="5" name="Text Placeholder 4"/>
+          <p:cNvSpPr>
+            <a:spLocks noGrp="1"/>
+          </p:cNvSpPr>
+          <p:nvPr>
+            <p:ph type="body" idx="1"/>
+          </p:nvPr>
+        </p:nvSpPr>
+        <p:spPr/>
+        <p:txBody>
+          <a:bodyPr/>
+          <a:lstStyle/>
+          <a:p>
+            <a:endParaRPr lang="en-US"/>
+          </a:p>
+        </p:txBody>
+      </p:sp>
+    </p:spTree>
+    <p:extLst>
+      <p:ext uri="{BB962C8B-B14F-4D97-AF65-F5344CB8AC3E}">
+        <p14:creationId xmlns:p14="http://schemas.microsoft.com/office/powerpoint/2010/main" val="601874588"/>
       </p:ext>
     </p:extLst>
   </p:cSld>

</xml_diff>